<commit_message>
fix: change class content
</commit_message>
<xml_diff>
--- a/doc/#1_basic/Basic_class_02.pptx
+++ b/doc/#1_basic/Basic_class_02.pptx
@@ -345,7 +345,7 @@
           <a:p>
             <a:fld id="{DBEFAE78-189D-4A7D-9189-B6B2058620B8}" type="datetimeFigureOut">
               <a:rPr lang="ko-KR" altLang="en-US" smtClean="0"/>
-              <a:t>2020-12-25</a:t>
+              <a:t>2021-07-25</a:t>
             </a:fld>
             <a:endParaRPr lang="ko-KR" altLang="en-US"/>
           </a:p>
@@ -754,7 +754,7 @@
           <a:p>
             <a:fld id="{1D8BD707-D9CF-40AE-B4C6-C98DA3205C09}" type="datetimeFigureOut">
               <a:rPr lang="en-US" smtClean="0"/>
-              <a:t>12/25/2020</a:t>
+              <a:t>7/25/2021</a:t>
             </a:fld>
             <a:endParaRPr lang="en-US"/>
           </a:p>
@@ -924,7 +924,7 @@
           <a:p>
             <a:fld id="{1D8BD707-D9CF-40AE-B4C6-C98DA3205C09}" type="datetimeFigureOut">
               <a:rPr lang="en-US" smtClean="0"/>
-              <a:t>12/25/2020</a:t>
+              <a:t>7/25/2021</a:t>
             </a:fld>
             <a:endParaRPr lang="en-US"/>
           </a:p>
@@ -1104,7 +1104,7 @@
           <a:p>
             <a:fld id="{1D8BD707-D9CF-40AE-B4C6-C98DA3205C09}" type="datetimeFigureOut">
               <a:rPr lang="en-US" smtClean="0"/>
-              <a:t>12/25/2020</a:t>
+              <a:t>7/25/2021</a:t>
             </a:fld>
             <a:endParaRPr lang="en-US"/>
           </a:p>
@@ -1274,7 +1274,7 @@
           <a:p>
             <a:fld id="{1D8BD707-D9CF-40AE-B4C6-C98DA3205C09}" type="datetimeFigureOut">
               <a:rPr lang="en-US" smtClean="0"/>
-              <a:t>12/25/2020</a:t>
+              <a:t>7/25/2021</a:t>
             </a:fld>
             <a:endParaRPr lang="en-US"/>
           </a:p>
@@ -1525,7 +1525,7 @@
           <a:p>
             <a:fld id="{1D8BD707-D9CF-40AE-B4C6-C98DA3205C09}" type="datetimeFigureOut">
               <a:rPr lang="en-US" smtClean="0"/>
-              <a:t>12/25/2020</a:t>
+              <a:t>7/25/2021</a:t>
             </a:fld>
             <a:endParaRPr lang="en-US"/>
           </a:p>
@@ -1757,7 +1757,7 @@
           <a:p>
             <a:fld id="{1D8BD707-D9CF-40AE-B4C6-C98DA3205C09}" type="datetimeFigureOut">
               <a:rPr lang="en-US" smtClean="0"/>
-              <a:t>12/25/2020</a:t>
+              <a:t>7/25/2021</a:t>
             </a:fld>
             <a:endParaRPr lang="en-US"/>
           </a:p>
@@ -2104,7 +2104,7 @@
           <a:p>
             <a:fld id="{1D8BD707-D9CF-40AE-B4C6-C98DA3205C09}" type="datetimeFigureOut">
               <a:rPr lang="en-US" smtClean="0"/>
-              <a:t>12/25/2020</a:t>
+              <a:t>7/25/2021</a:t>
             </a:fld>
             <a:endParaRPr lang="en-US"/>
           </a:p>
@@ -2222,7 +2222,7 @@
           <a:p>
             <a:fld id="{1D8BD707-D9CF-40AE-B4C6-C98DA3205C09}" type="datetimeFigureOut">
               <a:rPr lang="en-US" smtClean="0"/>
-              <a:t>12/25/2020</a:t>
+              <a:t>7/25/2021</a:t>
             </a:fld>
             <a:endParaRPr lang="en-US"/>
           </a:p>
@@ -2340,7 +2340,7 @@
           <a:p>
             <a:fld id="{1D8BD707-D9CF-40AE-B4C6-C98DA3205C09}" type="datetimeFigureOut">
               <a:rPr lang="en-US" smtClean="0"/>
-              <a:t>12/25/2020</a:t>
+              <a:t>7/25/2021</a:t>
             </a:fld>
             <a:endParaRPr lang="en-US"/>
           </a:p>
@@ -2624,7 +2624,7 @@
           <a:p>
             <a:fld id="{1D8BD707-D9CF-40AE-B4C6-C98DA3205C09}" type="datetimeFigureOut">
               <a:rPr lang="en-US" smtClean="0"/>
-              <a:t>12/25/2020</a:t>
+              <a:t>7/25/2021</a:t>
             </a:fld>
             <a:endParaRPr lang="en-US"/>
           </a:p>
@@ -2888,7 +2888,7 @@
           <a:p>
             <a:fld id="{1D8BD707-D9CF-40AE-B4C6-C98DA3205C09}" type="datetimeFigureOut">
               <a:rPr lang="en-US" smtClean="0"/>
-              <a:t>12/25/2020</a:t>
+              <a:t>7/25/2021</a:t>
             </a:fld>
             <a:endParaRPr lang="en-US"/>
           </a:p>
@@ -3102,7 +3102,7 @@
           <a:p>
             <a:fld id="{1D8BD707-D9CF-40AE-B4C6-C98DA3205C09}" type="datetimeFigureOut">
               <a:rPr lang="en-US" smtClean="0"/>
-              <a:t>12/25/2020</a:t>
+              <a:t>7/25/2021</a:t>
             </a:fld>
             <a:endParaRPr lang="en-US"/>
           </a:p>
@@ -20821,8 +20821,8 @@
         </p:nvSpPr>
         <p:spPr>
           <a:xfrm>
-            <a:off x="624941" y="481901"/>
-            <a:ext cx="6329680" cy="504625"/>
+            <a:off x="624940" y="389568"/>
+            <a:ext cx="6842659" cy="689291"/>
           </a:xfrm>
           <a:prstGeom prst="rect">
             <a:avLst/>
@@ -26346,8 +26346,8 @@
         </p:nvSpPr>
         <p:spPr>
           <a:xfrm>
-            <a:off x="632258" y="416064"/>
-            <a:ext cx="4228465" cy="504625"/>
+            <a:off x="632258" y="323731"/>
+            <a:ext cx="6225742" cy="689291"/>
           </a:xfrm>
           <a:prstGeom prst="rect">
             <a:avLst/>
@@ -36305,8 +36305,8 @@
         </p:nvSpPr>
         <p:spPr>
           <a:xfrm>
-            <a:off x="632258" y="388919"/>
-            <a:ext cx="4015942" cy="504625"/>
+            <a:off x="632258" y="296586"/>
+            <a:ext cx="5158942" cy="689291"/>
           </a:xfrm>
           <a:prstGeom prst="rect">
             <a:avLst/>

</xml_diff>